<commit_message>
o add CMake file for building example projects...
</commit_message>
<xml_diff>
--- a/lec/00-Setup GIT.pptx
+++ b/lec/00-Setup GIT.pptx
@@ -15,7 +15,11 @@
     <p:sldId id="265" r:id="rId9"/>
     <p:sldId id="260" r:id="rId10"/>
     <p:sldId id="262" r:id="rId11"/>
-    <p:sldId id="266" r:id="rId12"/>
+    <p:sldId id="269" r:id="rId12"/>
+    <p:sldId id="267" r:id="rId13"/>
+    <p:sldId id="268" r:id="rId14"/>
+    <p:sldId id="266" r:id="rId15"/>
+    <p:sldId id="270" r:id="rId16"/>
   </p:sldIdLst>
   <p:sldSz cx="12192000" cy="6858000"/>
   <p:notesSz cx="6858000" cy="9144000"/>
@@ -253,7 +257,7 @@
           <a:p>
             <a:fld id="{DFB8C107-6F8D-4B21-8691-4E1EDA2C9733}" type="datetimeFigureOut">
               <a:rPr lang="en-US" smtClean="0"/>
-              <a:t>9/27/2019</a:t>
+              <a:t>9/30/2019</a:t>
             </a:fld>
             <a:endParaRPr lang="en-US"/>
           </a:p>
@@ -423,7 +427,7 @@
           <a:p>
             <a:fld id="{DFB8C107-6F8D-4B21-8691-4E1EDA2C9733}" type="datetimeFigureOut">
               <a:rPr lang="en-US" smtClean="0"/>
-              <a:t>9/27/2019</a:t>
+              <a:t>9/30/2019</a:t>
             </a:fld>
             <a:endParaRPr lang="en-US"/>
           </a:p>
@@ -603,7 +607,7 @@
           <a:p>
             <a:fld id="{DFB8C107-6F8D-4B21-8691-4E1EDA2C9733}" type="datetimeFigureOut">
               <a:rPr lang="en-US" smtClean="0"/>
-              <a:t>9/27/2019</a:t>
+              <a:t>9/30/2019</a:t>
             </a:fld>
             <a:endParaRPr lang="en-US"/>
           </a:p>
@@ -773,7 +777,7 @@
           <a:p>
             <a:fld id="{DFB8C107-6F8D-4B21-8691-4E1EDA2C9733}" type="datetimeFigureOut">
               <a:rPr lang="en-US" smtClean="0"/>
-              <a:t>9/27/2019</a:t>
+              <a:t>9/30/2019</a:t>
             </a:fld>
             <a:endParaRPr lang="en-US"/>
           </a:p>
@@ -1019,7 +1023,7 @@
           <a:p>
             <a:fld id="{DFB8C107-6F8D-4B21-8691-4E1EDA2C9733}" type="datetimeFigureOut">
               <a:rPr lang="en-US" smtClean="0"/>
-              <a:t>9/27/2019</a:t>
+              <a:t>9/30/2019</a:t>
             </a:fld>
             <a:endParaRPr lang="en-US"/>
           </a:p>
@@ -1251,7 +1255,7 @@
           <a:p>
             <a:fld id="{DFB8C107-6F8D-4B21-8691-4E1EDA2C9733}" type="datetimeFigureOut">
               <a:rPr lang="en-US" smtClean="0"/>
-              <a:t>9/27/2019</a:t>
+              <a:t>9/30/2019</a:t>
             </a:fld>
             <a:endParaRPr lang="en-US"/>
           </a:p>
@@ -1618,7 +1622,7 @@
           <a:p>
             <a:fld id="{DFB8C107-6F8D-4B21-8691-4E1EDA2C9733}" type="datetimeFigureOut">
               <a:rPr lang="en-US" smtClean="0"/>
-              <a:t>9/27/2019</a:t>
+              <a:t>9/30/2019</a:t>
             </a:fld>
             <a:endParaRPr lang="en-US"/>
           </a:p>
@@ -1736,7 +1740,7 @@
           <a:p>
             <a:fld id="{DFB8C107-6F8D-4B21-8691-4E1EDA2C9733}" type="datetimeFigureOut">
               <a:rPr lang="en-US" smtClean="0"/>
-              <a:t>9/27/2019</a:t>
+              <a:t>9/30/2019</a:t>
             </a:fld>
             <a:endParaRPr lang="en-US"/>
           </a:p>
@@ -1831,7 +1835,7 @@
           <a:p>
             <a:fld id="{DFB8C107-6F8D-4B21-8691-4E1EDA2C9733}" type="datetimeFigureOut">
               <a:rPr lang="en-US" smtClean="0"/>
-              <a:t>9/27/2019</a:t>
+              <a:t>9/30/2019</a:t>
             </a:fld>
             <a:endParaRPr lang="en-US"/>
           </a:p>
@@ -2108,7 +2112,7 @@
           <a:p>
             <a:fld id="{DFB8C107-6F8D-4B21-8691-4E1EDA2C9733}" type="datetimeFigureOut">
               <a:rPr lang="en-US" smtClean="0"/>
-              <a:t>9/27/2019</a:t>
+              <a:t>9/30/2019</a:t>
             </a:fld>
             <a:endParaRPr lang="en-US"/>
           </a:p>
@@ -2361,7 +2365,7 @@
           <a:p>
             <a:fld id="{DFB8C107-6F8D-4B21-8691-4E1EDA2C9733}" type="datetimeFigureOut">
               <a:rPr lang="en-US" smtClean="0"/>
-              <a:t>9/27/2019</a:t>
+              <a:t>9/30/2019</a:t>
             </a:fld>
             <a:endParaRPr lang="en-US"/>
           </a:p>
@@ -2574,7 +2578,7 @@
           <a:p>
             <a:fld id="{DFB8C107-6F8D-4B21-8691-4E1EDA2C9733}" type="datetimeFigureOut">
               <a:rPr lang="en-US" smtClean="0"/>
-              <a:t>9/27/2019</a:t>
+              <a:t>9/30/2019</a:t>
             </a:fld>
             <a:endParaRPr lang="en-US"/>
           </a:p>
@@ -3046,7 +3050,6 @@
               <a:rPr lang="en-US" dirty="0" smtClean="0"/>
               <a:t>CSCE593</a:t>
             </a:r>
-            <a:endParaRPr lang="en-US" dirty="0" smtClean="0"/>
           </a:p>
         </p:txBody>
       </p:sp>
@@ -3199,9 +3202,59 @@
               <a:rPr lang="en-US" sz="2400" dirty="0">
                 <a:hlinkClick r:id="rId5"/>
               </a:rPr>
-              <a:t>https://visualstudio.microsoft.com/vs/</a:t>
+              <a:t>https://visualstudio.microsoft.com/vs</a:t>
+            </a:r>
+            <a:r>
+              <a:rPr lang="en-US" sz="2400" dirty="0" smtClean="0">
+                <a:hlinkClick r:id="rId5"/>
+              </a:rPr>
+              <a:t>/</a:t>
             </a:r>
             <a:endParaRPr lang="en-US" sz="2400" dirty="0" smtClean="0"/>
+          </a:p>
+          <a:p>
+            <a:r>
+              <a:rPr lang="en-US" sz="1800" dirty="0" smtClean="0"/>
+              <a:t>Windows Subsystem for Linux (WSL) (</a:t>
+            </a:r>
+            <a:r>
+              <a:rPr lang="en-US" sz="1800" dirty="0">
+                <a:hlinkClick r:id="rId6"/>
+              </a:rPr>
+              <a:t>https://</a:t>
+            </a:r>
+            <a:r>
+              <a:rPr lang="en-US" sz="1800" dirty="0" smtClean="0">
+                <a:hlinkClick r:id="rId6"/>
+              </a:rPr>
+              <a:t>docs.microsoft.com/en-us/windows/wsl/install-win10</a:t>
+            </a:r>
+            <a:r>
+              <a:rPr lang="en-US" sz="1800" dirty="0" smtClean="0"/>
+              <a:t>)</a:t>
+            </a:r>
+          </a:p>
+          <a:p>
+            <a:pPr lvl="1"/>
+            <a:r>
+              <a:rPr lang="en-US" sz="2000" dirty="0" smtClean="0"/>
+              <a:t>Install Ubuntu 18.04</a:t>
+            </a:r>
+          </a:p>
+          <a:p>
+            <a:pPr lvl="1"/>
+            <a:r>
+              <a:rPr lang="en-US" sz="2000" dirty="0" smtClean="0"/>
+              <a:t>Login and install GNU Compiler (</a:t>
+            </a:r>
+            <a:r>
+              <a:rPr lang="en-US" sz="2000" dirty="0" err="1" smtClean="0"/>
+              <a:t>sudo</a:t>
+            </a:r>
+            <a:r>
+              <a:rPr lang="en-US" sz="2000" dirty="0" smtClean="0"/>
+              <a:t> apt install g++)</a:t>
+            </a:r>
           </a:p>
           <a:p>
             <a:endParaRPr lang="en-US" dirty="0"/>
@@ -3255,7 +3308,383 @@
           <a:p>
             <a:r>
               <a:rPr lang="en-US" dirty="0" smtClean="0"/>
-              <a:t>DO NOT List</a:t>
+              <a:t>MSVC 2019 Community Install Options</a:t>
+            </a:r>
+            <a:endParaRPr lang="en-US" dirty="0"/>
+          </a:p>
+        </p:txBody>
+      </p:sp>
+      <p:sp>
+        <p:nvSpPr>
+          <p:cNvPr id="3" name="Content Placeholder 2"/>
+          <p:cNvSpPr>
+            <a:spLocks noGrp="1"/>
+          </p:cNvSpPr>
+          <p:nvPr>
+            <p:ph idx="1"/>
+          </p:nvPr>
+        </p:nvSpPr>
+        <p:spPr/>
+        <p:txBody>
+          <a:bodyPr/>
+          <a:lstStyle/>
+          <a:p>
+            <a:r>
+              <a:rPr lang="en-US" dirty="0" smtClean="0"/>
+              <a:t>Desktop &amp; Mobile</a:t>
+            </a:r>
+          </a:p>
+          <a:p>
+            <a:pPr lvl="1"/>
+            <a:r>
+              <a:rPr lang="en-US" dirty="0" smtClean="0"/>
+              <a:t>Desktop Development with C++ (Check this checkbox)</a:t>
+            </a:r>
+          </a:p>
+          <a:p>
+            <a:r>
+              <a:rPr lang="en-US" dirty="0" smtClean="0"/>
+              <a:t>Gaming</a:t>
+            </a:r>
+          </a:p>
+          <a:p>
+            <a:pPr lvl="1"/>
+            <a:r>
+              <a:rPr lang="en-US" dirty="0" smtClean="0"/>
+              <a:t>Game development with C++ (Check this checkbox)</a:t>
+            </a:r>
+          </a:p>
+          <a:p>
+            <a:r>
+              <a:rPr lang="en-US" dirty="0" smtClean="0"/>
+              <a:t>Other Toolsets</a:t>
+            </a:r>
+          </a:p>
+          <a:p>
+            <a:pPr lvl="1"/>
+            <a:r>
+              <a:rPr lang="en-US" dirty="0" smtClean="0"/>
+              <a:t>Linux development with C++ (Check this checkbox)</a:t>
+            </a:r>
+          </a:p>
+          <a:p>
+            <a:pPr lvl="1"/>
+            <a:endParaRPr lang="en-US" dirty="0"/>
+          </a:p>
+          <a:p>
+            <a:r>
+              <a:rPr lang="en-US" dirty="0" smtClean="0"/>
+              <a:t>Total space required to install ~6.94GB</a:t>
+            </a:r>
+            <a:endParaRPr lang="en-US" dirty="0"/>
+          </a:p>
+        </p:txBody>
+      </p:sp>
+    </p:spTree>
+    <p:extLst>
+      <p:ext uri="{BB962C8B-B14F-4D97-AF65-F5344CB8AC3E}">
+        <p14:creationId xmlns:p14="http://schemas.microsoft.com/office/powerpoint/2010/main" val="4198585953"/>
+      </p:ext>
+    </p:extLst>
+  </p:cSld>
+  <p:clrMapOvr>
+    <a:masterClrMapping/>
+  </p:clrMapOvr>
+</p:sld>
+</file>
+
+<file path=ppt/slides/slide12.xml><?xml version="1.0" encoding="utf-8"?>
+<p:sld xmlns:a="http://schemas.openxmlformats.org/drawingml/2006/main" xmlns:r="http://schemas.openxmlformats.org/officeDocument/2006/relationships" xmlns:p="http://schemas.openxmlformats.org/presentationml/2006/main">
+  <p:cSld>
+    <p:spTree>
+      <p:nvGrpSpPr>
+        <p:cNvPr id="1" name=""/>
+        <p:cNvGrpSpPr/>
+        <p:nvPr/>
+      </p:nvGrpSpPr>
+      <p:grpSpPr>
+        <a:xfrm>
+          <a:off x="0" y="0"/>
+          <a:ext cx="0" cy="0"/>
+          <a:chOff x="0" y="0"/>
+          <a:chExt cx="0" cy="0"/>
+        </a:xfrm>
+      </p:grpSpPr>
+      <p:sp>
+        <p:nvSpPr>
+          <p:cNvPr id="2" name="Title 1"/>
+          <p:cNvSpPr>
+            <a:spLocks noGrp="1"/>
+          </p:cNvSpPr>
+          <p:nvPr>
+            <p:ph type="title"/>
+          </p:nvPr>
+        </p:nvSpPr>
+        <p:spPr/>
+        <p:txBody>
+          <a:bodyPr/>
+          <a:lstStyle/>
+          <a:p>
+            <a:r>
+              <a:rPr lang="en-US" dirty="0" smtClean="0"/>
+              <a:t>What is GIT Commit and Push</a:t>
+            </a:r>
+            <a:endParaRPr lang="en-US" dirty="0"/>
+          </a:p>
+        </p:txBody>
+      </p:sp>
+      <p:sp>
+        <p:nvSpPr>
+          <p:cNvPr id="3" name="Content Placeholder 2"/>
+          <p:cNvSpPr>
+            <a:spLocks noGrp="1"/>
+          </p:cNvSpPr>
+          <p:nvPr>
+            <p:ph idx="1"/>
+          </p:nvPr>
+        </p:nvSpPr>
+        <p:spPr/>
+        <p:txBody>
+          <a:bodyPr/>
+          <a:lstStyle/>
+          <a:p>
+            <a:r>
+              <a:rPr lang="en-US" dirty="0" smtClean="0"/>
+              <a:t>Distributed Version Control System</a:t>
+            </a:r>
+          </a:p>
+          <a:p>
+            <a:r>
+              <a:rPr lang="en-US" sz="1800" dirty="0" smtClean="0"/>
+              <a:t>GIT for Beginners (</a:t>
+            </a:r>
+            <a:r>
+              <a:rPr lang="en-US" sz="1800" dirty="0">
+                <a:hlinkClick r:id="rId2"/>
+              </a:rPr>
+              <a:t>https://www.liquidlight.co.uk/blog/git-for-beginners-an-overview-and-basic-workflow</a:t>
+            </a:r>
+            <a:r>
+              <a:rPr lang="en-US" sz="1800" dirty="0" smtClean="0">
+                <a:hlinkClick r:id="rId2"/>
+              </a:rPr>
+              <a:t>/</a:t>
+            </a:r>
+            <a:r>
+              <a:rPr lang="en-US" sz="1800" dirty="0" smtClean="0"/>
+              <a:t>)</a:t>
+            </a:r>
+          </a:p>
+          <a:p>
+            <a:r>
+              <a:rPr lang="en-US" sz="2000" dirty="0"/>
+              <a:t>Quick Reference for many common tasks (</a:t>
+            </a:r>
+            <a:r>
+              <a:rPr lang="en-US" sz="2000" dirty="0">
+                <a:hlinkClick r:id="rId3"/>
+              </a:rPr>
+              <a:t>https://rogerdudler.github.io/git-guide</a:t>
+            </a:r>
+            <a:r>
+              <a:rPr lang="en-US" sz="2000" dirty="0" smtClean="0">
+                <a:hlinkClick r:id="rId3"/>
+              </a:rPr>
+              <a:t>/</a:t>
+            </a:r>
+            <a:r>
+              <a:rPr lang="en-US" sz="2000" dirty="0" smtClean="0"/>
+              <a:t>)</a:t>
+            </a:r>
+          </a:p>
+          <a:p>
+            <a:r>
+              <a:rPr lang="en-US" sz="2000" dirty="0" smtClean="0"/>
+              <a:t>YouTube 5 min video: </a:t>
+            </a:r>
+            <a:r>
+              <a:rPr lang="en-US" sz="2000" dirty="0">
+                <a:hlinkClick r:id="rId4"/>
+              </a:rPr>
+              <a:t>https://www.youtube.com/watch?v=xvwBtODV0ms</a:t>
+            </a:r>
+            <a:endParaRPr lang="en-US" sz="2000" dirty="0"/>
+          </a:p>
+        </p:txBody>
+      </p:sp>
+    </p:spTree>
+    <p:extLst>
+      <p:ext uri="{BB962C8B-B14F-4D97-AF65-F5344CB8AC3E}">
+        <p14:creationId xmlns:p14="http://schemas.microsoft.com/office/powerpoint/2010/main" val="2015703500"/>
+      </p:ext>
+    </p:extLst>
+  </p:cSld>
+  <p:clrMapOvr>
+    <a:masterClrMapping/>
+  </p:clrMapOvr>
+</p:sld>
+</file>
+
+<file path=ppt/slides/slide13.xml><?xml version="1.0" encoding="utf-8"?>
+<p:sld xmlns:a="http://schemas.openxmlformats.org/drawingml/2006/main" xmlns:r="http://schemas.openxmlformats.org/officeDocument/2006/relationships" xmlns:p="http://schemas.openxmlformats.org/presentationml/2006/main">
+  <p:cSld>
+    <p:spTree>
+      <p:nvGrpSpPr>
+        <p:cNvPr id="1" name=""/>
+        <p:cNvGrpSpPr/>
+        <p:nvPr/>
+      </p:nvGrpSpPr>
+      <p:grpSpPr>
+        <a:xfrm>
+          <a:off x="0" y="0"/>
+          <a:ext cx="0" cy="0"/>
+          <a:chOff x="0" y="0"/>
+          <a:chExt cx="0" cy="0"/>
+        </a:xfrm>
+      </p:grpSpPr>
+      <p:sp>
+        <p:nvSpPr>
+          <p:cNvPr id="2" name="Title 1"/>
+          <p:cNvSpPr>
+            <a:spLocks noGrp="1"/>
+          </p:cNvSpPr>
+          <p:nvPr>
+            <p:ph type="title"/>
+          </p:nvPr>
+        </p:nvSpPr>
+        <p:spPr>
+          <a:xfrm>
+            <a:off x="5892800" y="365125"/>
+            <a:ext cx="5461000" cy="1325563"/>
+          </a:xfrm>
+        </p:spPr>
+        <p:txBody>
+          <a:bodyPr/>
+          <a:lstStyle/>
+          <a:p>
+            <a:r>
+              <a:rPr lang="en-US" dirty="0" smtClean="0"/>
+              <a:t>Quick Hello World for GIT – code/00</a:t>
+            </a:r>
+            <a:endParaRPr lang="en-US" dirty="0"/>
+          </a:p>
+        </p:txBody>
+      </p:sp>
+      <p:sp>
+        <p:nvSpPr>
+          <p:cNvPr id="3" name="Content Placeholder 2"/>
+          <p:cNvSpPr>
+            <a:spLocks noGrp="1"/>
+          </p:cNvSpPr>
+          <p:nvPr>
+            <p:ph idx="1"/>
+          </p:nvPr>
+        </p:nvSpPr>
+        <p:spPr/>
+        <p:txBody>
+          <a:bodyPr/>
+          <a:lstStyle/>
+          <a:p>
+            <a:endParaRPr lang="en-US" dirty="0"/>
+          </a:p>
+        </p:txBody>
+      </p:sp>
+      <p:pic>
+        <p:nvPicPr>
+          <p:cNvPr id="4" name="Picture 3"/>
+          <p:cNvPicPr>
+            <a:picLocks noChangeAspect="1"/>
+          </p:cNvPicPr>
+          <p:nvPr/>
+        </p:nvPicPr>
+        <p:blipFill>
+          <a:blip r:embed="rId2"/>
+          <a:stretch>
+            <a:fillRect/>
+          </a:stretch>
+        </p:blipFill>
+        <p:spPr>
+          <a:xfrm>
+            <a:off x="1" y="1"/>
+            <a:ext cx="5809376" cy="6858000"/>
+          </a:xfrm>
+          <a:prstGeom prst="rect">
+            <a:avLst/>
+          </a:prstGeom>
+        </p:spPr>
+      </p:pic>
+      <p:pic>
+        <p:nvPicPr>
+          <p:cNvPr id="6" name="Picture 5"/>
+          <p:cNvPicPr>
+            <a:picLocks noChangeAspect="1"/>
+          </p:cNvPicPr>
+          <p:nvPr/>
+        </p:nvPicPr>
+        <p:blipFill>
+          <a:blip r:embed="rId3"/>
+          <a:stretch>
+            <a:fillRect/>
+          </a:stretch>
+        </p:blipFill>
+        <p:spPr>
+          <a:xfrm>
+            <a:off x="5817929" y="2209800"/>
+            <a:ext cx="6374070" cy="4648201"/>
+          </a:xfrm>
+          <a:prstGeom prst="rect">
+            <a:avLst/>
+          </a:prstGeom>
+        </p:spPr>
+      </p:pic>
+    </p:spTree>
+    <p:extLst>
+      <p:ext uri="{BB962C8B-B14F-4D97-AF65-F5344CB8AC3E}">
+        <p14:creationId xmlns:p14="http://schemas.microsoft.com/office/powerpoint/2010/main" val="1236430108"/>
+      </p:ext>
+    </p:extLst>
+  </p:cSld>
+  <p:clrMapOvr>
+    <a:masterClrMapping/>
+  </p:clrMapOvr>
+</p:sld>
+</file>
+
+<file path=ppt/slides/slide14.xml><?xml version="1.0" encoding="utf-8"?>
+<p:sld xmlns:a="http://schemas.openxmlformats.org/drawingml/2006/main" xmlns:r="http://schemas.openxmlformats.org/officeDocument/2006/relationships" xmlns:p="http://schemas.openxmlformats.org/presentationml/2006/main">
+  <p:cSld>
+    <p:spTree>
+      <p:nvGrpSpPr>
+        <p:cNvPr id="1" name=""/>
+        <p:cNvGrpSpPr/>
+        <p:nvPr/>
+      </p:nvGrpSpPr>
+      <p:grpSpPr>
+        <a:xfrm>
+          <a:off x="0" y="0"/>
+          <a:ext cx="0" cy="0"/>
+          <a:chOff x="0" y="0"/>
+          <a:chExt cx="0" cy="0"/>
+        </a:xfrm>
+      </p:grpSpPr>
+      <p:sp>
+        <p:nvSpPr>
+          <p:cNvPr id="2" name="Title 1"/>
+          <p:cNvSpPr>
+            <a:spLocks noGrp="1"/>
+          </p:cNvSpPr>
+          <p:nvPr>
+            <p:ph type="title"/>
+          </p:nvPr>
+        </p:nvSpPr>
+        <p:spPr/>
+        <p:txBody>
+          <a:bodyPr/>
+          <a:lstStyle/>
+          <a:p>
+            <a:r>
+              <a:rPr lang="en-US" dirty="0" smtClean="0"/>
+              <a:t>GIT -- DO NOT do these things</a:t>
             </a:r>
             <a:endParaRPr lang="en-US" dirty="0"/>
           </a:p>
@@ -3312,11 +3741,19 @@
             </a:r>
             <a:r>
               <a:rPr lang="en-US" dirty="0" smtClean="0"/>
-              <a:t> or cwin64/ (will conflict with </a:t>
-            </a:r>
-            <a:r>
-              <a:rPr lang="en-US" smtClean="0"/>
-              <a:t>group members)</a:t>
+              <a:t> or cwin64/ (will conflict with group members)</a:t>
+            </a:r>
+          </a:p>
+          <a:p>
+            <a:r>
+              <a:rPr lang="en-US" dirty="0" smtClean="0"/>
+              <a:t>Do *NOT* commit passwords in shared repos</a:t>
+            </a:r>
+          </a:p>
+          <a:p>
+            <a:r>
+              <a:rPr lang="en-US" dirty="0" smtClean="0"/>
+              <a:t>Cannot remove a file once it is pushed – it is there “forever”</a:t>
             </a:r>
             <a:endParaRPr lang="en-US" dirty="0"/>
           </a:p>
@@ -3326,6 +3763,100 @@
     <p:extLst>
       <p:ext uri="{BB962C8B-B14F-4D97-AF65-F5344CB8AC3E}">
         <p14:creationId xmlns:p14="http://schemas.microsoft.com/office/powerpoint/2010/main" val="3789965550"/>
+      </p:ext>
+    </p:extLst>
+  </p:cSld>
+  <p:clrMapOvr>
+    <a:masterClrMapping/>
+  </p:clrMapOvr>
+</p:sld>
+</file>
+
+<file path=ppt/slides/slide15.xml><?xml version="1.0" encoding="utf-8"?>
+<p:sld xmlns:a="http://schemas.openxmlformats.org/drawingml/2006/main" xmlns:r="http://schemas.openxmlformats.org/officeDocument/2006/relationships" xmlns:p="http://schemas.openxmlformats.org/presentationml/2006/main">
+  <p:cSld>
+    <p:spTree>
+      <p:nvGrpSpPr>
+        <p:cNvPr id="1" name=""/>
+        <p:cNvGrpSpPr/>
+        <p:nvPr/>
+      </p:nvGrpSpPr>
+      <p:grpSpPr>
+        <a:xfrm>
+          <a:off x="0" y="0"/>
+          <a:ext cx="0" cy="0"/>
+          <a:chOff x="0" y="0"/>
+          <a:chExt cx="0" cy="0"/>
+        </a:xfrm>
+      </p:grpSpPr>
+      <p:sp>
+        <p:nvSpPr>
+          <p:cNvPr id="2" name="Title 1"/>
+          <p:cNvSpPr>
+            <a:spLocks noGrp="1"/>
+          </p:cNvSpPr>
+          <p:nvPr>
+            <p:ph type="title"/>
+          </p:nvPr>
+        </p:nvSpPr>
+        <p:spPr/>
+        <p:txBody>
+          <a:bodyPr/>
+          <a:lstStyle/>
+          <a:p>
+            <a:r>
+              <a:rPr lang="en-US" dirty="0" err="1" smtClean="0"/>
+              <a:t>Cmake</a:t>
+            </a:r>
+            <a:r>
+              <a:rPr lang="en-US" dirty="0" smtClean="0"/>
+              <a:t> – Cross Platform Build Tool</a:t>
+            </a:r>
+            <a:endParaRPr lang="en-US" dirty="0"/>
+          </a:p>
+        </p:txBody>
+      </p:sp>
+      <p:sp>
+        <p:nvSpPr>
+          <p:cNvPr id="3" name="Content Placeholder 2"/>
+          <p:cNvSpPr>
+            <a:spLocks noGrp="1"/>
+          </p:cNvSpPr>
+          <p:nvPr>
+            <p:ph idx="1"/>
+          </p:nvPr>
+        </p:nvSpPr>
+        <p:spPr/>
+        <p:txBody>
+          <a:bodyPr/>
+          <a:lstStyle/>
+          <a:p>
+            <a:r>
+              <a:rPr lang="en-US" dirty="0" smtClean="0"/>
+              <a:t>Windows, Linux, OS X, Android, iOS, Arduino, Solaris, FreeBSD</a:t>
+            </a:r>
+          </a:p>
+          <a:p>
+            <a:r>
+              <a:rPr lang="en-US" dirty="0" smtClean="0"/>
+              <a:t>x86, x86_64, x87, ARM32, ARM64, PowerPC, RISC-V</a:t>
+            </a:r>
+          </a:p>
+          <a:p>
+            <a:r>
+              <a:rPr lang="en-US" dirty="0" smtClean="0"/>
+              <a:t>Special Micro-code to accelerate special instructions MMX, SSE, H.265</a:t>
+            </a:r>
+          </a:p>
+          <a:p>
+            <a:endParaRPr lang="en-US" dirty="0"/>
+          </a:p>
+        </p:txBody>
+      </p:sp>
+    </p:spTree>
+    <p:extLst>
+      <p:ext uri="{BB962C8B-B14F-4D97-AF65-F5344CB8AC3E}">
+        <p14:creationId xmlns:p14="http://schemas.microsoft.com/office/powerpoint/2010/main" val="1663805681"/>
       </p:ext>
     </p:extLst>
   </p:cSld>
@@ -4776,7 +5307,7 @@
       </p:grpSpPr>
       <p:pic>
         <p:nvPicPr>
-          <p:cNvPr id="2" name="Picture 1"/>
+          <p:cNvPr id="3" name="Picture 2"/>
           <p:cNvPicPr>
             <a:picLocks noChangeAspect="1"/>
           </p:cNvPicPr>
@@ -4790,8 +5321,8 @@
         </p:blipFill>
         <p:spPr>
           <a:xfrm>
-            <a:off x="3139811" y="109086"/>
-            <a:ext cx="7936970" cy="10186730"/>
+            <a:off x="3287448" y="225286"/>
+            <a:ext cx="7767637" cy="9969399"/>
           </a:xfrm>
           <a:prstGeom prst="rect">
             <a:avLst/>
@@ -4884,8 +5415,8 @@
         </p:nvCxnSpPr>
         <p:spPr>
           <a:xfrm flipH="1">
-            <a:off x="3594100" y="5552559"/>
-            <a:ext cx="4392612" cy="1089541"/>
+            <a:off x="5683250" y="5552559"/>
+            <a:ext cx="2303462" cy="930791"/>
           </a:xfrm>
           <a:prstGeom prst="straightConnector1">
             <a:avLst/>
@@ -5053,8 +5584,8 @@
         </p:nvCxnSpPr>
         <p:spPr>
           <a:xfrm flipH="1">
-            <a:off x="5314950" y="2313516"/>
-            <a:ext cx="3226858" cy="893289"/>
+            <a:off x="5391150" y="2313516"/>
+            <a:ext cx="3150658" cy="777919"/>
           </a:xfrm>
           <a:prstGeom prst="straightConnector1">
             <a:avLst/>
@@ -5279,6 +5810,86 @@
           </a:fontRef>
         </p:style>
       </p:cxnSp>
+      <p:cxnSp>
+        <p:nvCxnSpPr>
+          <p:cNvPr id="20" name="Straight Arrow Connector 19"/>
+          <p:cNvCxnSpPr>
+            <a:stCxn id="21" idx="1"/>
+          </p:cNvCxnSpPr>
+          <p:nvPr/>
+        </p:nvCxnSpPr>
+        <p:spPr>
+          <a:xfrm flipH="1">
+            <a:off x="7499350" y="7566395"/>
+            <a:ext cx="723768" cy="1863355"/>
+          </a:xfrm>
+          <a:prstGeom prst="straightConnector1">
+            <a:avLst/>
+          </a:prstGeom>
+          <a:ln w="22225">
+            <a:solidFill>
+              <a:srgbClr val="FF0000"/>
+            </a:solidFill>
+            <a:headEnd w="lg" len="lg"/>
+            <a:tailEnd type="triangle" w="lg" len="lg"/>
+          </a:ln>
+        </p:spPr>
+        <p:style>
+          <a:lnRef idx="1">
+            <a:schemeClr val="accent1"/>
+          </a:lnRef>
+          <a:fillRef idx="0">
+            <a:schemeClr val="accent1"/>
+          </a:fillRef>
+          <a:effectRef idx="0">
+            <a:schemeClr val="accent1"/>
+          </a:effectRef>
+          <a:fontRef idx="minor">
+            <a:schemeClr val="tx1"/>
+          </a:fontRef>
+        </p:style>
+      </p:cxnSp>
+      <p:sp>
+        <p:nvSpPr>
+          <p:cNvPr id="21" name="TextBox 20"/>
+          <p:cNvSpPr txBox="1"/>
+          <p:nvPr/>
+        </p:nvSpPr>
+        <p:spPr>
+          <a:xfrm>
+            <a:off x="8223118" y="7150896"/>
+            <a:ext cx="3726392" cy="830997"/>
+          </a:xfrm>
+          <a:prstGeom prst="rect">
+            <a:avLst/>
+          </a:prstGeom>
+          <a:solidFill>
+            <a:schemeClr val="bg1"/>
+          </a:solidFill>
+          <a:ln>
+            <a:solidFill>
+              <a:srgbClr val="FF0000"/>
+            </a:solidFill>
+          </a:ln>
+        </p:spPr>
+        <p:txBody>
+          <a:bodyPr wrap="square" rtlCol="0">
+            <a:spAutoFit/>
+          </a:bodyPr>
+          <a:lstStyle/>
+          <a:p>
+            <a:r>
+              <a:rPr lang="en-US" sz="1600" dirty="0" smtClean="0"/>
+              <a:t>These new files are now on your hard drive or have been updated to </a:t>
+            </a:r>
+            <a:r>
+              <a:rPr lang="en-US" sz="1600" smtClean="0"/>
+              <a:t>newer versions.</a:t>
+            </a:r>
+            <a:endParaRPr lang="en-US" sz="1600" dirty="0"/>
+          </a:p>
+        </p:txBody>
+      </p:sp>
     </p:spTree>
     <p:extLst>
       <p:ext uri="{BB962C8B-B14F-4D97-AF65-F5344CB8AC3E}">

</xml_diff>

<commit_message>
o Posted latest GIT slides...
</commit_message>
<xml_diff>
--- a/lec/00-Setup GIT.pptx
+++ b/lec/00-Setup GIT.pptx
@@ -257,7 +257,7 @@
           <a:p>
             <a:fld id="{DFB8C107-6F8D-4B21-8691-4E1EDA2C9733}" type="datetimeFigureOut">
               <a:rPr lang="en-US" smtClean="0"/>
-              <a:t>9/30/2019</a:t>
+              <a:t>10/1/2019</a:t>
             </a:fld>
             <a:endParaRPr lang="en-US"/>
           </a:p>
@@ -427,7 +427,7 @@
           <a:p>
             <a:fld id="{DFB8C107-6F8D-4B21-8691-4E1EDA2C9733}" type="datetimeFigureOut">
               <a:rPr lang="en-US" smtClean="0"/>
-              <a:t>9/30/2019</a:t>
+              <a:t>10/1/2019</a:t>
             </a:fld>
             <a:endParaRPr lang="en-US"/>
           </a:p>
@@ -607,7 +607,7 @@
           <a:p>
             <a:fld id="{DFB8C107-6F8D-4B21-8691-4E1EDA2C9733}" type="datetimeFigureOut">
               <a:rPr lang="en-US" smtClean="0"/>
-              <a:t>9/30/2019</a:t>
+              <a:t>10/1/2019</a:t>
             </a:fld>
             <a:endParaRPr lang="en-US"/>
           </a:p>
@@ -777,7 +777,7 @@
           <a:p>
             <a:fld id="{DFB8C107-6F8D-4B21-8691-4E1EDA2C9733}" type="datetimeFigureOut">
               <a:rPr lang="en-US" smtClean="0"/>
-              <a:t>9/30/2019</a:t>
+              <a:t>10/1/2019</a:t>
             </a:fld>
             <a:endParaRPr lang="en-US"/>
           </a:p>
@@ -1023,7 +1023,7 @@
           <a:p>
             <a:fld id="{DFB8C107-6F8D-4B21-8691-4E1EDA2C9733}" type="datetimeFigureOut">
               <a:rPr lang="en-US" smtClean="0"/>
-              <a:t>9/30/2019</a:t>
+              <a:t>10/1/2019</a:t>
             </a:fld>
             <a:endParaRPr lang="en-US"/>
           </a:p>
@@ -1255,7 +1255,7 @@
           <a:p>
             <a:fld id="{DFB8C107-6F8D-4B21-8691-4E1EDA2C9733}" type="datetimeFigureOut">
               <a:rPr lang="en-US" smtClean="0"/>
-              <a:t>9/30/2019</a:t>
+              <a:t>10/1/2019</a:t>
             </a:fld>
             <a:endParaRPr lang="en-US"/>
           </a:p>
@@ -1622,7 +1622,7 @@
           <a:p>
             <a:fld id="{DFB8C107-6F8D-4B21-8691-4E1EDA2C9733}" type="datetimeFigureOut">
               <a:rPr lang="en-US" smtClean="0"/>
-              <a:t>9/30/2019</a:t>
+              <a:t>10/1/2019</a:t>
             </a:fld>
             <a:endParaRPr lang="en-US"/>
           </a:p>
@@ -1740,7 +1740,7 @@
           <a:p>
             <a:fld id="{DFB8C107-6F8D-4B21-8691-4E1EDA2C9733}" type="datetimeFigureOut">
               <a:rPr lang="en-US" smtClean="0"/>
-              <a:t>9/30/2019</a:t>
+              <a:t>10/1/2019</a:t>
             </a:fld>
             <a:endParaRPr lang="en-US"/>
           </a:p>
@@ -1835,7 +1835,7 @@
           <a:p>
             <a:fld id="{DFB8C107-6F8D-4B21-8691-4E1EDA2C9733}" type="datetimeFigureOut">
               <a:rPr lang="en-US" smtClean="0"/>
-              <a:t>9/30/2019</a:t>
+              <a:t>10/1/2019</a:t>
             </a:fld>
             <a:endParaRPr lang="en-US"/>
           </a:p>
@@ -2112,7 +2112,7 @@
           <a:p>
             <a:fld id="{DFB8C107-6F8D-4B21-8691-4E1EDA2C9733}" type="datetimeFigureOut">
               <a:rPr lang="en-US" smtClean="0"/>
-              <a:t>9/30/2019</a:t>
+              <a:t>10/1/2019</a:t>
             </a:fld>
             <a:endParaRPr lang="en-US"/>
           </a:p>
@@ -2365,7 +2365,7 @@
           <a:p>
             <a:fld id="{DFB8C107-6F8D-4B21-8691-4E1EDA2C9733}" type="datetimeFigureOut">
               <a:rPr lang="en-US" smtClean="0"/>
-              <a:t>9/30/2019</a:t>
+              <a:t>10/1/2019</a:t>
             </a:fld>
             <a:endParaRPr lang="en-US"/>
           </a:p>
@@ -2578,7 +2578,7 @@
           <a:p>
             <a:fld id="{DFB8C107-6F8D-4B21-8691-4E1EDA2C9733}" type="datetimeFigureOut">
               <a:rPr lang="en-US" smtClean="0"/>
-              <a:t>9/30/2019</a:t>
+              <a:t>10/1/2019</a:t>
             </a:fld>
             <a:endParaRPr lang="en-US"/>
           </a:p>
@@ -3559,14 +3559,27 @@
           </a:xfrm>
         </p:spPr>
         <p:txBody>
-          <a:bodyPr/>
-          <a:lstStyle/>
-          <a:p>
-            <a:r>
-              <a:rPr lang="en-US" dirty="0" smtClean="0"/>
-              <a:t>Quick Hello World for GIT – code/00</a:t>
-            </a:r>
-            <a:endParaRPr lang="en-US" dirty="0"/>
+          <a:bodyPr>
+            <a:noAutofit/>
+          </a:bodyPr>
+          <a:lstStyle/>
+          <a:p>
+            <a:r>
+              <a:rPr lang="en-US" sz="2800" dirty="0" smtClean="0"/>
+              <a:t>Quick Hello World for GIT – </a:t>
+            </a:r>
+            <a:r>
+              <a:rPr lang="en-US" sz="2800" dirty="0" smtClean="0"/>
+              <a:t>code/00</a:t>
+            </a:r>
+            <a:br>
+              <a:rPr lang="en-US" sz="2800" dirty="0" smtClean="0"/>
+            </a:br>
+            <a:r>
+              <a:rPr lang="en-US" sz="2800" dirty="0" smtClean="0"/>
+              <a:t>First git add, git commit, git push</a:t>
+            </a:r>
+            <a:endParaRPr lang="en-US" sz="2800" dirty="0"/>
           </a:p>
         </p:txBody>
       </p:sp>

</xml_diff>